<commit_message>
Ajustes menores. Mejoras en el EA
</commit_message>
<xml_diff>
--- a/04 - IS - Mantenimiento .pptx
+++ b/04 - IS - Mantenimiento .pptx
@@ -5,7 +5,7 @@
     <p:sldMasterId id="2147483840" r:id="rId1"/>
   </p:sldMasterIdLst>
   <p:notesMasterIdLst>
-    <p:notesMasterId r:id="rId97"/>
+    <p:notesMasterId r:id="rId98"/>
   </p:notesMasterIdLst>
   <p:sldIdLst>
     <p:sldId id="256" r:id="rId2"/>
@@ -103,6 +103,7 @@
     <p:sldId id="378" r:id="rId94"/>
     <p:sldId id="290" r:id="rId95"/>
     <p:sldId id="291" r:id="rId96"/>
+    <p:sldId id="440" r:id="rId97"/>
   </p:sldIdLst>
   <p:sldSz cx="12192000" cy="6858000"/>
   <p:notesSz cx="6858000" cy="9144000"/>
@@ -224,13 +225,22 @@
 <file path=ppt/revisionInfo.xml><?xml version="1.0" encoding="utf-8"?>
 <p1510:revInfo xmlns:a="http://schemas.openxmlformats.org/drawingml/2006/main" xmlns:r="http://schemas.openxmlformats.org/officeDocument/2006/relationships" xmlns:p1510="http://schemas.microsoft.com/office/powerpoint/2015/10/main">
   <p1510:revLst>
-    <p1510:client id="{6BAD9109-090F-134F-AC31-9977F0E99B7D}" v="1" dt="2019-05-10T10:54:03.312"/>
+    <p1510:client id="{6BAD9109-090F-134F-AC31-9977F0E99B7D}" v="2" dt="2019-06-20T12:46:58.090"/>
   </p1510:revLst>
 </p1510:revInfo>
 </file>
 
 <file path=ppt/changesInfos/changesInfo1.xml><?xml version="1.0" encoding="utf-8"?>
 <pc:chgInfo xmlns:a="http://schemas.openxmlformats.org/drawingml/2006/main" xmlns:r="http://schemas.openxmlformats.org/officeDocument/2006/relationships" xmlns:ac="http://schemas.microsoft.com/office/drawing/2013/main/command" xmlns:pc="http://schemas.microsoft.com/office/powerpoint/2013/main/command">
+  <pc:docChgLst>
+    <pc:chgData name="Victor Valotto" userId="f8cd04a3a901a375" providerId="LiveId" clId="{5A345204-3C57-C94C-B1A3-E23824FCEA03}"/>
+    <pc:docChg chg="undo custSel addSld delSld modSld">
+      <pc:chgData name="Victor Valotto" userId="f8cd04a3a901a375" providerId="LiveId" clId="{5A345204-3C57-C94C-B1A3-E23824FCEA03}" dt="2019-04-16T20:07:52.625" v="220" actId="1076"/>
+      <pc:docMkLst>
+        <pc:docMk/>
+      </pc:docMkLst>
+    </pc:docChg>
+  </pc:docChgLst>
   <pc:docChgLst>
     <pc:chgData name="Victor Valotto" userId="f8cd04a3a901a375" providerId="LiveId" clId="{B3EC4247-3503-F34F-B457-B7E68ADEB118}"/>
     <pc:docChg chg="custSel addSld delSld modSld">
@@ -1074,118 +1084,9 @@
     </pc:docChg>
   </pc:docChgLst>
   <pc:docChgLst>
-    <pc:chgData name="Victor Valotto" userId="f8cd04a3a901a375" providerId="Windows Live" clId="Web-{A89FD163-3F83-4992-A24A-C4CFC36F36D6}"/>
-    <pc:docChg chg="modSld">
-      <pc:chgData name="Victor Valotto" userId="f8cd04a3a901a375" providerId="Windows Live" clId="Web-{A89FD163-3F83-4992-A24A-C4CFC36F36D6}" dt="2019-05-15T18:54:30.640" v="32" actId="1076"/>
-      <pc:docMkLst>
-        <pc:docMk/>
-      </pc:docMkLst>
-      <pc:sldChg chg="modSp">
-        <pc:chgData name="Victor Valotto" userId="f8cd04a3a901a375" providerId="Windows Live" clId="Web-{A89FD163-3F83-4992-A24A-C4CFC36F36D6}" dt="2019-05-15T14:55:36.053" v="8" actId="20577"/>
-        <pc:sldMkLst>
-          <pc:docMk/>
-          <pc:sldMk cId="4143034434" sldId="256"/>
-        </pc:sldMkLst>
-        <pc:spChg chg="mod">
-          <ac:chgData name="Victor Valotto" userId="f8cd04a3a901a375" providerId="Windows Live" clId="Web-{A89FD163-3F83-4992-A24A-C4CFC36F36D6}" dt="2019-05-15T14:55:36.053" v="8" actId="20577"/>
-          <ac:spMkLst>
-            <pc:docMk/>
-            <pc:sldMk cId="4143034434" sldId="256"/>
-            <ac:spMk id="2" creationId="{E87BCC9F-5D7D-FF4D-8BE0-02DB4CF4979F}"/>
-          </ac:spMkLst>
-        </pc:spChg>
-      </pc:sldChg>
-      <pc:sldChg chg="modSp">
-        <pc:chgData name="Victor Valotto" userId="f8cd04a3a901a375" providerId="Windows Live" clId="Web-{A89FD163-3F83-4992-A24A-C4CFC36F36D6}" dt="2019-05-15T14:57:49.679" v="24" actId="20577"/>
-        <pc:sldMkLst>
-          <pc:docMk/>
-          <pc:sldMk cId="3772020004" sldId="293"/>
-        </pc:sldMkLst>
-        <pc:spChg chg="mod">
-          <ac:chgData name="Victor Valotto" userId="f8cd04a3a901a375" providerId="Windows Live" clId="Web-{A89FD163-3F83-4992-A24A-C4CFC36F36D6}" dt="2019-05-15T14:57:49.679" v="24" actId="20577"/>
-          <ac:spMkLst>
-            <pc:docMk/>
-            <pc:sldMk cId="3772020004" sldId="293"/>
-            <ac:spMk id="2" creationId="{00000000-0000-0000-0000-000000000000}"/>
-          </ac:spMkLst>
-        </pc:spChg>
-      </pc:sldChg>
-      <pc:sldChg chg="modSp">
-        <pc:chgData name="Victor Valotto" userId="f8cd04a3a901a375" providerId="Windows Live" clId="Web-{A89FD163-3F83-4992-A24A-C4CFC36F36D6}" dt="2019-05-15T15:05:41.258" v="29" actId="14100"/>
-        <pc:sldMkLst>
-          <pc:docMk/>
-          <pc:sldMk cId="1143030211" sldId="306"/>
-        </pc:sldMkLst>
-        <pc:spChg chg="mod">
-          <ac:chgData name="Victor Valotto" userId="f8cd04a3a901a375" providerId="Windows Live" clId="Web-{A89FD163-3F83-4992-A24A-C4CFC36F36D6}" dt="2019-05-15T15:05:41.258" v="29" actId="14100"/>
-          <ac:spMkLst>
-            <pc:docMk/>
-            <pc:sldMk cId="1143030211" sldId="306"/>
-            <ac:spMk id="3" creationId="{00000000-0000-0000-0000-000000000000}"/>
-          </ac:spMkLst>
-        </pc:spChg>
-      </pc:sldChg>
-      <pc:sldChg chg="modSp">
-        <pc:chgData name="Victor Valotto" userId="f8cd04a3a901a375" providerId="Windows Live" clId="Web-{A89FD163-3F83-4992-A24A-C4CFC36F36D6}" dt="2019-05-15T18:54:30.640" v="32" actId="1076"/>
-        <pc:sldMkLst>
-          <pc:docMk/>
-          <pc:sldMk cId="2090269744" sldId="343"/>
-        </pc:sldMkLst>
-        <pc:spChg chg="mod">
-          <ac:chgData name="Victor Valotto" userId="f8cd04a3a901a375" providerId="Windows Live" clId="Web-{A89FD163-3F83-4992-A24A-C4CFC36F36D6}" dt="2019-05-15T18:54:30.640" v="32" actId="1076"/>
-          <ac:spMkLst>
-            <pc:docMk/>
-            <pc:sldMk cId="2090269744" sldId="343"/>
-            <ac:spMk id="3" creationId="{00000000-0000-0000-0000-000000000000}"/>
-          </ac:spMkLst>
-        </pc:spChg>
-        <pc:picChg chg="mod">
-          <ac:chgData name="Victor Valotto" userId="f8cd04a3a901a375" providerId="Windows Live" clId="Web-{A89FD163-3F83-4992-A24A-C4CFC36F36D6}" dt="2019-05-15T18:54:26.281" v="30" actId="1076"/>
-          <ac:picMkLst>
-            <pc:docMk/>
-            <pc:sldMk cId="2090269744" sldId="343"/>
-            <ac:picMk id="11266" creationId="{00000000-0000-0000-0000-000000000000}"/>
-          </ac:picMkLst>
-        </pc:picChg>
-        <pc:picChg chg="mod">
-          <ac:chgData name="Victor Valotto" userId="f8cd04a3a901a375" providerId="Windows Live" clId="Web-{A89FD163-3F83-4992-A24A-C4CFC36F36D6}" dt="2019-05-15T18:54:27.203" v="31" actId="1076"/>
-          <ac:picMkLst>
-            <pc:docMk/>
-            <pc:sldMk cId="2090269744" sldId="343"/>
-            <ac:picMk id="11268" creationId="{00000000-0000-0000-0000-000000000000}"/>
-          </ac:picMkLst>
-        </pc:picChg>
-      </pc:sldChg>
-      <pc:sldChg chg="modSp">
-        <pc:chgData name="Victor Valotto" userId="f8cd04a3a901a375" providerId="Windows Live" clId="Web-{A89FD163-3F83-4992-A24A-C4CFC36F36D6}" dt="2019-05-15T14:56:44.757" v="12"/>
-        <pc:sldMkLst>
-          <pc:docMk/>
-          <pc:sldMk cId="3580461999" sldId="419"/>
-        </pc:sldMkLst>
-        <pc:spChg chg="mod">
-          <ac:chgData name="Victor Valotto" userId="f8cd04a3a901a375" providerId="Windows Live" clId="Web-{A89FD163-3F83-4992-A24A-C4CFC36F36D6}" dt="2019-05-15T14:56:44.757" v="12"/>
-          <ac:spMkLst>
-            <pc:docMk/>
-            <pc:sldMk cId="3580461999" sldId="419"/>
-            <ac:spMk id="2" creationId="{00000000-0000-0000-0000-000000000000}"/>
-          </ac:spMkLst>
-        </pc:spChg>
-      </pc:sldChg>
-    </pc:docChg>
-  </pc:docChgLst>
-  <pc:docChgLst>
-    <pc:chgData name="Victor Valotto" userId="f8cd04a3a901a375" providerId="LiveId" clId="{5A345204-3C57-C94C-B1A3-E23824FCEA03}"/>
-    <pc:docChg chg="undo custSel addSld delSld modSld">
-      <pc:chgData name="Victor Valotto" userId="f8cd04a3a901a375" providerId="LiveId" clId="{5A345204-3C57-C94C-B1A3-E23824FCEA03}" dt="2019-04-16T20:07:52.625" v="220" actId="1076"/>
-      <pc:docMkLst>
-        <pc:docMk/>
-      </pc:docMkLst>
-    </pc:docChg>
-  </pc:docChgLst>
-  <pc:docChgLst>
     <pc:chgData name="Victor Valotto" userId="f8cd04a3a901a375" providerId="LiveId" clId="{6BAD9109-090F-134F-AC31-9977F0E99B7D}"/>
-    <pc:docChg chg="undo custSel modSld sldOrd">
-      <pc:chgData name="Victor Valotto" userId="f8cd04a3a901a375" providerId="LiveId" clId="{6BAD9109-090F-134F-AC31-9977F0E99B7D}" dt="2019-05-10T10:57:43.928" v="146" actId="1076"/>
+    <pc:docChg chg="undo custSel addSld modSld sldOrd">
+      <pc:chgData name="Victor Valotto" userId="f8cd04a3a901a375" providerId="LiveId" clId="{6BAD9109-090F-134F-AC31-9977F0E99B7D}" dt="2019-06-20T12:46:58.073" v="151"/>
       <pc:docMkLst>
         <pc:docMk/>
       </pc:docMkLst>
@@ -2735,7 +2636,7 @@
         </pc:picChg>
       </pc:sldChg>
       <pc:sldChg chg="modSp">
-        <pc:chgData name="Victor Valotto" userId="f8cd04a3a901a375" providerId="LiveId" clId="{6BAD9109-090F-134F-AC31-9977F0E99B7D}" dt="2019-05-10T10:54:55.953" v="123" actId="1076"/>
+        <pc:chgData name="Victor Valotto" userId="f8cd04a3a901a375" providerId="LiveId" clId="{6BAD9109-090F-134F-AC31-9977F0E99B7D}" dt="2019-06-20T12:45:21.042" v="150" actId="1076"/>
         <pc:sldMkLst>
           <pc:docMk/>
           <pc:sldMk cId="3504522797" sldId="352"/>
@@ -2749,7 +2650,7 @@
           </ac:spMkLst>
         </pc:spChg>
         <pc:spChg chg="mod">
-          <ac:chgData name="Victor Valotto" userId="f8cd04a3a901a375" providerId="LiveId" clId="{6BAD9109-090F-134F-AC31-9977F0E99B7D}" dt="2019-05-10T10:54:55.953" v="123" actId="1076"/>
+          <ac:chgData name="Victor Valotto" userId="f8cd04a3a901a375" providerId="LiveId" clId="{6BAD9109-090F-134F-AC31-9977F0E99B7D}" dt="2019-06-20T12:45:21.042" v="150" actId="1076"/>
           <ac:spMkLst>
             <pc:docMk/>
             <pc:sldMk cId="3504522797" sldId="352"/>
@@ -3706,11 +3607,19 @@
         </pc:picChg>
       </pc:sldChg>
       <pc:sldChg chg="modSp">
-        <pc:chgData name="Victor Valotto" userId="f8cd04a3a901a375" providerId="LiveId" clId="{6BAD9109-090F-134F-AC31-9977F0E99B7D}" dt="2019-05-10T10:52:54.047" v="105" actId="1076"/>
+        <pc:chgData name="Victor Valotto" userId="f8cd04a3a901a375" providerId="LiveId" clId="{6BAD9109-090F-134F-AC31-9977F0E99B7D}" dt="2019-06-20T12:44:30.478" v="148" actId="404"/>
         <pc:sldMkLst>
           <pc:docMk/>
           <pc:sldMk cId="3255173732" sldId="425"/>
         </pc:sldMkLst>
+        <pc:spChg chg="mod">
+          <ac:chgData name="Victor Valotto" userId="f8cd04a3a901a375" providerId="LiveId" clId="{6BAD9109-090F-134F-AC31-9977F0E99B7D}" dt="2019-06-20T12:44:30.478" v="148" actId="404"/>
+          <ac:spMkLst>
+            <pc:docMk/>
+            <pc:sldMk cId="3255173732" sldId="425"/>
+            <ac:spMk id="2" creationId="{00000000-0000-0000-0000-000000000000}"/>
+          </ac:spMkLst>
+        </pc:spChg>
         <pc:spChg chg="mod">
           <ac:chgData name="Victor Valotto" userId="f8cd04a3a901a375" providerId="LiveId" clId="{6BAD9109-090F-134F-AC31-9977F0E99B7D}" dt="2019-05-10T10:52:54.047" v="105" actId="1076"/>
           <ac:spMkLst>
@@ -3721,13 +3630,13 @@
         </pc:spChg>
       </pc:sldChg>
       <pc:sldChg chg="modSp">
-        <pc:chgData name="Victor Valotto" userId="f8cd04a3a901a375" providerId="LiveId" clId="{6BAD9109-090F-134F-AC31-9977F0E99B7D}" dt="2019-05-10T10:53:02.473" v="107" actId="14100"/>
+        <pc:chgData name="Victor Valotto" userId="f8cd04a3a901a375" providerId="LiveId" clId="{6BAD9109-090F-134F-AC31-9977F0E99B7D}" dt="2019-06-20T12:44:38.213" v="149" actId="404"/>
         <pc:sldMkLst>
           <pc:docMk/>
           <pc:sldMk cId="36618980" sldId="426"/>
         </pc:sldMkLst>
         <pc:spChg chg="mod">
-          <ac:chgData name="Victor Valotto" userId="f8cd04a3a901a375" providerId="LiveId" clId="{6BAD9109-090F-134F-AC31-9977F0E99B7D}" dt="2019-05-10T10:53:02.473" v="107" actId="14100"/>
+          <ac:chgData name="Victor Valotto" userId="f8cd04a3a901a375" providerId="LiveId" clId="{6BAD9109-090F-134F-AC31-9977F0E99B7D}" dt="2019-06-20T12:44:38.213" v="149" actId="404"/>
           <ac:spMkLst>
             <pc:docMk/>
             <pc:sldMk cId="36618980" sldId="426"/>
@@ -3740,6 +3649,113 @@
             <pc:docMk/>
             <pc:sldMk cId="36618980" sldId="426"/>
             <ac:spMk id="3" creationId="{00000000-0000-0000-0000-000000000000}"/>
+          </ac:spMkLst>
+        </pc:spChg>
+      </pc:sldChg>
+      <pc:sldChg chg="add">
+        <pc:chgData name="Victor Valotto" userId="f8cd04a3a901a375" providerId="LiveId" clId="{6BAD9109-090F-134F-AC31-9977F0E99B7D}" dt="2019-06-20T12:46:58.073" v="151"/>
+        <pc:sldMkLst>
+          <pc:docMk/>
+          <pc:sldMk cId="917694736" sldId="440"/>
+        </pc:sldMkLst>
+      </pc:sldChg>
+    </pc:docChg>
+  </pc:docChgLst>
+  <pc:docChgLst>
+    <pc:chgData name="Victor Valotto" userId="f8cd04a3a901a375" providerId="Windows Live" clId="Web-{A89FD163-3F83-4992-A24A-C4CFC36F36D6}"/>
+    <pc:docChg chg="modSld">
+      <pc:chgData name="Victor Valotto" userId="f8cd04a3a901a375" providerId="Windows Live" clId="Web-{A89FD163-3F83-4992-A24A-C4CFC36F36D6}" dt="2019-05-15T18:54:30.640" v="32" actId="1076"/>
+      <pc:docMkLst>
+        <pc:docMk/>
+      </pc:docMkLst>
+      <pc:sldChg chg="modSp">
+        <pc:chgData name="Victor Valotto" userId="f8cd04a3a901a375" providerId="Windows Live" clId="Web-{A89FD163-3F83-4992-A24A-C4CFC36F36D6}" dt="2019-05-15T14:55:36.053" v="8" actId="20577"/>
+        <pc:sldMkLst>
+          <pc:docMk/>
+          <pc:sldMk cId="4143034434" sldId="256"/>
+        </pc:sldMkLst>
+        <pc:spChg chg="mod">
+          <ac:chgData name="Victor Valotto" userId="f8cd04a3a901a375" providerId="Windows Live" clId="Web-{A89FD163-3F83-4992-A24A-C4CFC36F36D6}" dt="2019-05-15T14:55:36.053" v="8" actId="20577"/>
+          <ac:spMkLst>
+            <pc:docMk/>
+            <pc:sldMk cId="4143034434" sldId="256"/>
+            <ac:spMk id="2" creationId="{E87BCC9F-5D7D-FF4D-8BE0-02DB4CF4979F}"/>
+          </ac:spMkLst>
+        </pc:spChg>
+      </pc:sldChg>
+      <pc:sldChg chg="modSp">
+        <pc:chgData name="Victor Valotto" userId="f8cd04a3a901a375" providerId="Windows Live" clId="Web-{A89FD163-3F83-4992-A24A-C4CFC36F36D6}" dt="2019-05-15T14:57:49.679" v="24" actId="20577"/>
+        <pc:sldMkLst>
+          <pc:docMk/>
+          <pc:sldMk cId="3772020004" sldId="293"/>
+        </pc:sldMkLst>
+        <pc:spChg chg="mod">
+          <ac:chgData name="Victor Valotto" userId="f8cd04a3a901a375" providerId="Windows Live" clId="Web-{A89FD163-3F83-4992-A24A-C4CFC36F36D6}" dt="2019-05-15T14:57:49.679" v="24" actId="20577"/>
+          <ac:spMkLst>
+            <pc:docMk/>
+            <pc:sldMk cId="3772020004" sldId="293"/>
+            <ac:spMk id="2" creationId="{00000000-0000-0000-0000-000000000000}"/>
+          </ac:spMkLst>
+        </pc:spChg>
+      </pc:sldChg>
+      <pc:sldChg chg="modSp">
+        <pc:chgData name="Victor Valotto" userId="f8cd04a3a901a375" providerId="Windows Live" clId="Web-{A89FD163-3F83-4992-A24A-C4CFC36F36D6}" dt="2019-05-15T15:05:41.258" v="29" actId="14100"/>
+        <pc:sldMkLst>
+          <pc:docMk/>
+          <pc:sldMk cId="1143030211" sldId="306"/>
+        </pc:sldMkLst>
+        <pc:spChg chg="mod">
+          <ac:chgData name="Victor Valotto" userId="f8cd04a3a901a375" providerId="Windows Live" clId="Web-{A89FD163-3F83-4992-A24A-C4CFC36F36D6}" dt="2019-05-15T15:05:41.258" v="29" actId="14100"/>
+          <ac:spMkLst>
+            <pc:docMk/>
+            <pc:sldMk cId="1143030211" sldId="306"/>
+            <ac:spMk id="3" creationId="{00000000-0000-0000-0000-000000000000}"/>
+          </ac:spMkLst>
+        </pc:spChg>
+      </pc:sldChg>
+      <pc:sldChg chg="modSp">
+        <pc:chgData name="Victor Valotto" userId="f8cd04a3a901a375" providerId="Windows Live" clId="Web-{A89FD163-3F83-4992-A24A-C4CFC36F36D6}" dt="2019-05-15T18:54:30.640" v="32" actId="1076"/>
+        <pc:sldMkLst>
+          <pc:docMk/>
+          <pc:sldMk cId="2090269744" sldId="343"/>
+        </pc:sldMkLst>
+        <pc:spChg chg="mod">
+          <ac:chgData name="Victor Valotto" userId="f8cd04a3a901a375" providerId="Windows Live" clId="Web-{A89FD163-3F83-4992-A24A-C4CFC36F36D6}" dt="2019-05-15T18:54:30.640" v="32" actId="1076"/>
+          <ac:spMkLst>
+            <pc:docMk/>
+            <pc:sldMk cId="2090269744" sldId="343"/>
+            <ac:spMk id="3" creationId="{00000000-0000-0000-0000-000000000000}"/>
+          </ac:spMkLst>
+        </pc:spChg>
+        <pc:picChg chg="mod">
+          <ac:chgData name="Victor Valotto" userId="f8cd04a3a901a375" providerId="Windows Live" clId="Web-{A89FD163-3F83-4992-A24A-C4CFC36F36D6}" dt="2019-05-15T18:54:26.281" v="30" actId="1076"/>
+          <ac:picMkLst>
+            <pc:docMk/>
+            <pc:sldMk cId="2090269744" sldId="343"/>
+            <ac:picMk id="11266" creationId="{00000000-0000-0000-0000-000000000000}"/>
+          </ac:picMkLst>
+        </pc:picChg>
+        <pc:picChg chg="mod">
+          <ac:chgData name="Victor Valotto" userId="f8cd04a3a901a375" providerId="Windows Live" clId="Web-{A89FD163-3F83-4992-A24A-C4CFC36F36D6}" dt="2019-05-15T18:54:27.203" v="31" actId="1076"/>
+          <ac:picMkLst>
+            <pc:docMk/>
+            <pc:sldMk cId="2090269744" sldId="343"/>
+            <ac:picMk id="11268" creationId="{00000000-0000-0000-0000-000000000000}"/>
+          </ac:picMkLst>
+        </pc:picChg>
+      </pc:sldChg>
+      <pc:sldChg chg="modSp">
+        <pc:chgData name="Victor Valotto" userId="f8cd04a3a901a375" providerId="Windows Live" clId="Web-{A89FD163-3F83-4992-A24A-C4CFC36F36D6}" dt="2019-05-15T14:56:44.757" v="12"/>
+        <pc:sldMkLst>
+          <pc:docMk/>
+          <pc:sldMk cId="3580461999" sldId="419"/>
+        </pc:sldMkLst>
+        <pc:spChg chg="mod">
+          <ac:chgData name="Victor Valotto" userId="f8cd04a3a901a375" providerId="Windows Live" clId="Web-{A89FD163-3F83-4992-A24A-C4CFC36F36D6}" dt="2019-05-15T14:56:44.757" v="12"/>
+          <ac:spMkLst>
+            <pc:docMk/>
+            <pc:sldMk cId="3580461999" sldId="419"/>
+            <ac:spMk id="2" creationId="{00000000-0000-0000-0000-000000000000}"/>
           </ac:spMkLst>
         </pc:spChg>
       </pc:sldChg>
@@ -3830,7 +3846,7 @@
           <a:p>
             <a:fld id="{FCD5C82B-EBA5-0F4A-84B0-95236E926059}" type="datetimeFigureOut">
               <a:rPr lang="es-AR" smtClean="0"/>
-              <a:t>15/5/2019</a:t>
+              <a:t>20/6/19</a:t>
             </a:fld>
             <a:endParaRPr lang="es-AR"/>
           </a:p>
@@ -3989,7 +4005,7 @@
           <a:p>
             <a:fld id="{EE8E8876-0579-AF4B-8ECE-B7B81E189DEA}" type="slidenum">
               <a:rPr lang="es-AR" smtClean="0"/>
-              <a:t>‹#›</a:t>
+              <a:t>‹Nº›</a:t>
             </a:fld>
             <a:endParaRPr lang="es-AR"/>
           </a:p>
@@ -6914,7 +6930,7 @@
           <a:p>
             <a:fld id="{5A8CC0B5-6BC3-C84F-8F54-9B398EF3DA59}" type="datetime1">
               <a:rPr lang="es-AR" smtClean="0"/>
-              <a:t>15/5/2019</a:t>
+              <a:t>20/6/19</a:t>
             </a:fld>
             <a:endParaRPr lang="en-US" dirty="0"/>
           </a:p>
@@ -6957,7 +6973,7 @@
             <a:fld id="{4FAB73BC-B049-4115-A692-8D63A059BFB8}" type="slidenum">
               <a:rPr lang="en-US" dirty="0"/>
               <a:pPr/>
-              <a:t>‹#›</a:t>
+              <a:t>‹Nº›</a:t>
             </a:fld>
             <a:endParaRPr lang="en-US" dirty="0"/>
           </a:p>
@@ -7080,7 +7096,7 @@
           <a:p>
             <a:fld id="{C59214C8-AED1-2141-8518-C498EA3FCDAB}" type="datetime1">
               <a:rPr lang="es-AR" smtClean="0"/>
-              <a:t>15/5/2019</a:t>
+              <a:t>20/6/19</a:t>
             </a:fld>
             <a:endParaRPr lang="en-US" dirty="0"/>
           </a:p>
@@ -7123,7 +7139,7 @@
             <a:fld id="{4FAB73BC-B049-4115-A692-8D63A059BFB8}" type="slidenum">
               <a:rPr lang="en-US" dirty="0"/>
               <a:pPr/>
-              <a:t>‹#›</a:t>
+              <a:t>‹Nº›</a:t>
             </a:fld>
             <a:endParaRPr lang="en-US" dirty="0"/>
           </a:p>
@@ -7256,7 +7272,7 @@
           <a:p>
             <a:fld id="{1659E45A-9617-FD48-BF6D-537BAF27EA62}" type="datetime1">
               <a:rPr lang="es-AR" smtClean="0"/>
-              <a:t>15/5/2019</a:t>
+              <a:t>20/6/19</a:t>
             </a:fld>
             <a:endParaRPr lang="en-US" dirty="0"/>
           </a:p>
@@ -7299,7 +7315,7 @@
             <a:fld id="{4FAB73BC-B049-4115-A692-8D63A059BFB8}" type="slidenum">
               <a:rPr lang="en-US" dirty="0"/>
               <a:pPr/>
-              <a:t>‹#›</a:t>
+              <a:t>‹Nº›</a:t>
             </a:fld>
             <a:endParaRPr lang="en-US" dirty="0"/>
           </a:p>
@@ -7370,7 +7386,7 @@
           <a:p>
             <a:fld id="{775EE55E-951E-D34B-8E4C-662AE1BEB374}" type="datetime1">
               <a:rPr lang="es-AR" smtClean="0"/>
-              <a:t>15/5/2019</a:t>
+              <a:t>20/6/19</a:t>
             </a:fld>
             <a:endParaRPr lang="es-AR"/>
           </a:p>
@@ -7415,7 +7431,7 @@
           <a:p>
             <a:fld id="{ADDD444B-9BA7-4839-9538-2E5C85273323}" type="slidenum">
               <a:rPr lang="es-AR" smtClean="0"/>
-              <a:t>‹#›</a:t>
+              <a:t>‹Nº›</a:t>
             </a:fld>
             <a:endParaRPr lang="es-AR"/>
           </a:p>
@@ -7657,7 +7673,7 @@
           <a:p>
             <a:fld id="{5FBFCB70-AD41-8840-A490-6D7CFAB5102F}" type="datetime1">
               <a:rPr lang="es-AR" smtClean="0"/>
-              <a:t>15/5/2019</a:t>
+              <a:t>20/6/19</a:t>
             </a:fld>
             <a:endParaRPr lang="en-US" dirty="0"/>
           </a:p>
@@ -7700,7 +7716,7 @@
             <a:fld id="{4FAB73BC-B049-4115-A692-8D63A059BFB8}" type="slidenum">
               <a:rPr lang="en-US" dirty="0"/>
               <a:pPr/>
-              <a:t>‹#›</a:t>
+              <a:t>‹Nº›</a:t>
             </a:fld>
             <a:endParaRPr lang="en-US" dirty="0"/>
           </a:p>
@@ -7911,7 +7927,7 @@
           <a:p>
             <a:fld id="{4ACB4E37-CF02-0048-A514-3B214D6E5E55}" type="datetime1">
               <a:rPr lang="es-AR" smtClean="0"/>
-              <a:t>15/5/2019</a:t>
+              <a:t>20/6/19</a:t>
             </a:fld>
             <a:endParaRPr lang="en-US" dirty="0"/>
           </a:p>
@@ -7954,7 +7970,7 @@
             <a:fld id="{4FAB73BC-B049-4115-A692-8D63A059BFB8}" type="slidenum">
               <a:rPr lang="en-US" dirty="0"/>
               <a:pPr/>
-              <a:t>‹#›</a:t>
+              <a:t>‹Nº›</a:t>
             </a:fld>
             <a:endParaRPr lang="en-US" dirty="0"/>
           </a:p>
@@ -8195,7 +8211,7 @@
           <a:p>
             <a:fld id="{8FE2C218-6F2A-2241-860B-758F2713E4F1}" type="datetime1">
               <a:rPr lang="es-AR" smtClean="0"/>
-              <a:t>15/5/2019</a:t>
+              <a:t>20/6/19</a:t>
             </a:fld>
             <a:endParaRPr lang="en-US" dirty="0"/>
           </a:p>
@@ -8238,7 +8254,7 @@
             <a:fld id="{4FAB73BC-B049-4115-A692-8D63A059BFB8}" type="slidenum">
               <a:rPr lang="en-US" dirty="0"/>
               <a:pPr/>
-              <a:t>‹#›</a:t>
+              <a:t>‹Nº›</a:t>
             </a:fld>
             <a:endParaRPr lang="en-US" dirty="0"/>
           </a:p>
@@ -8633,7 +8649,7 @@
           <a:p>
             <a:fld id="{4AEB6E7E-096B-A640-BB45-D986AC742CAB}" type="datetime1">
               <a:rPr lang="es-AR" smtClean="0"/>
-              <a:t>15/5/2019</a:t>
+              <a:t>20/6/19</a:t>
             </a:fld>
             <a:endParaRPr lang="en-US" dirty="0"/>
           </a:p>
@@ -8676,7 +8692,7 @@
             <a:fld id="{4FAB73BC-B049-4115-A692-8D63A059BFB8}" type="slidenum">
               <a:rPr lang="en-US" dirty="0"/>
               <a:pPr/>
-              <a:t>‹#›</a:t>
+              <a:t>‹Nº›</a:t>
             </a:fld>
             <a:endParaRPr lang="en-US" dirty="0"/>
           </a:p>
@@ -8747,7 +8763,7 @@
           <a:p>
             <a:fld id="{9C6B0780-BEE1-4A41-B50E-A83D679F3F91}" type="datetime1">
               <a:rPr lang="es-AR" smtClean="0"/>
-              <a:t>15/5/2019</a:t>
+              <a:t>20/6/19</a:t>
             </a:fld>
             <a:endParaRPr lang="en-US" dirty="0"/>
           </a:p>
@@ -8790,7 +8806,7 @@
             <a:fld id="{4FAB73BC-B049-4115-A692-8D63A059BFB8}" type="slidenum">
               <a:rPr lang="en-US" dirty="0"/>
               <a:pPr/>
-              <a:t>‹#›</a:t>
+              <a:t>‹Nº›</a:t>
             </a:fld>
             <a:endParaRPr lang="en-US" dirty="0"/>
           </a:p>
@@ -8838,7 +8854,7 @@
           <a:p>
             <a:fld id="{D6E6F094-CACB-F84E-AAF7-35A67BD73968}" type="datetime1">
               <a:rPr lang="es-AR" smtClean="0"/>
-              <a:t>15/5/2019</a:t>
+              <a:t>20/6/19</a:t>
             </a:fld>
             <a:endParaRPr lang="en-US" dirty="0"/>
           </a:p>
@@ -8881,7 +8897,7 @@
             <a:fld id="{4FAB73BC-B049-4115-A692-8D63A059BFB8}" type="slidenum">
               <a:rPr lang="en-US" dirty="0"/>
               <a:pPr/>
-              <a:t>‹#›</a:t>
+              <a:t>‹Nº›</a:t>
             </a:fld>
             <a:endParaRPr lang="en-US" dirty="0"/>
           </a:p>
@@ -9122,7 +9138,7 @@
           <a:p>
             <a:fld id="{F2536A63-D478-264D-B44D-5DDE4C942B26}" type="datetime1">
               <a:rPr lang="es-AR" smtClean="0"/>
-              <a:t>15/5/2019</a:t>
+              <a:t>20/6/19</a:t>
             </a:fld>
             <a:endParaRPr lang="en-US" dirty="0"/>
           </a:p>
@@ -9165,7 +9181,7 @@
             <a:fld id="{4FAB73BC-B049-4115-A692-8D63A059BFB8}" type="slidenum">
               <a:rPr lang="en-US" dirty="0"/>
               <a:pPr/>
-              <a:t>‹#›</a:t>
+              <a:t>‹Nº›</a:t>
             </a:fld>
             <a:endParaRPr lang="en-US" dirty="0"/>
           </a:p>
@@ -9391,7 +9407,7 @@
           <a:p>
             <a:fld id="{C708D9B4-8395-B546-B98C-7E9A1A02F45C}" type="datetime1">
               <a:rPr lang="es-AR" smtClean="0"/>
-              <a:t>15/5/2019</a:t>
+              <a:t>20/6/19</a:t>
             </a:fld>
             <a:endParaRPr lang="en-US" dirty="0"/>
           </a:p>
@@ -9439,7 +9455,7 @@
             <a:fld id="{4FAB73BC-B049-4115-A692-8D63A059BFB8}" type="slidenum">
               <a:rPr lang="en-US" dirty="0"/>
               <a:pPr/>
-              <a:t>‹#›</a:t>
+              <a:t>‹Nº›</a:t>
             </a:fld>
             <a:endParaRPr lang="en-US" dirty="0"/>
           </a:p>
@@ -9684,7 +9700,7 @@
           <a:p>
             <a:fld id="{ACDAD340-14F1-9440-8997-1614AF599595}" type="datetime1">
               <a:rPr lang="es-AR" smtClean="0"/>
-              <a:t>15/5/2019</a:t>
+              <a:t>20/6/19</a:t>
             </a:fld>
             <a:endParaRPr lang="en-US" dirty="0"/>
           </a:p>
@@ -9762,7 +9778,7 @@
             <a:fld id="{4FAB73BC-B049-4115-A692-8D63A059BFB8}" type="slidenum">
               <a:rPr lang="en-US" dirty="0"/>
               <a:pPr/>
-              <a:t>‹#›</a:t>
+              <a:t>‹Nº›</a:t>
             </a:fld>
             <a:endParaRPr lang="en-US" dirty="0"/>
           </a:p>
@@ -10357,7 +10373,7 @@
           <a:noFill/>
           <a:extLst>
             <a:ext uri="{909E8E84-426E-40dd-AFC4-6F175D3DCCD1}">
-              <a14:hiddenFill xmlns="" xmlns:a14="http://schemas.microsoft.com/office/drawing/2010/main">
+              <a14:hiddenFill xmlns:a14="http://schemas.microsoft.com/office/drawing/2010/main" xmlns="">
                 <a:solidFill>
                   <a:srgbClr val="FFFFFF"/>
                 </a:solidFill>
@@ -10388,7 +10404,7 @@
           <a:p>
             <a:fld id="{EB7486CE-3996-0F4A-99FF-63CDAF73E2AD}" type="datetime1">
               <a:rPr lang="es-AR" smtClean="0"/>
-              <a:t>15/5/2019</a:t>
+              <a:t>20/6/19</a:t>
             </a:fld>
             <a:endParaRPr lang="es-AR"/>
           </a:p>
@@ -10534,7 +10550,7 @@
           <a:noFill/>
           <a:extLst>
             <a:ext uri="{909E8E84-426E-40dd-AFC4-6F175D3DCCD1}">
-              <a14:hiddenFill xmlns="" xmlns:a14="http://schemas.microsoft.com/office/drawing/2010/main">
+              <a14:hiddenFill xmlns:a14="http://schemas.microsoft.com/office/drawing/2010/main" xmlns="">
                 <a:solidFill>
                   <a:srgbClr val="FFFFFF"/>
                 </a:solidFill>
@@ -10565,7 +10581,7 @@
           <a:p>
             <a:fld id="{EB7486CE-3996-0F4A-99FF-63CDAF73E2AD}" type="datetime1">
               <a:rPr lang="es-AR" smtClean="0"/>
-              <a:t>15/5/2019</a:t>
+              <a:t>20/6/19</a:t>
             </a:fld>
             <a:endParaRPr lang="es-AR"/>
           </a:p>
@@ -10697,7 +10713,7 @@
           <a:p>
             <a:fld id="{80BFE5E5-290E-034E-A488-4BAB9B256AEE}" type="datetime1">
               <a:rPr lang="es-AR" smtClean="0"/>
-              <a:t>15/5/2019</a:t>
+              <a:t>20/6/19</a:t>
             </a:fld>
             <a:endParaRPr lang="es-ES"/>
           </a:p>
@@ -11176,7 +11192,7 @@
           <a:p>
             <a:fld id="{C891735E-8206-B346-9E13-D1E7F610FCC8}" type="datetime1">
               <a:rPr lang="es-AR" smtClean="0"/>
-              <a:t>15/5/2019</a:t>
+              <a:t>20/6/19</a:t>
             </a:fld>
             <a:endParaRPr lang="es-ES"/>
           </a:p>
@@ -11296,7 +11312,7 @@
           <a:p>
             <a:fld id="{CAD0085B-3929-B941-82F1-225806D6FD45}" type="datetime1">
               <a:rPr lang="es-AR" smtClean="0"/>
-              <a:t>15/5/2019</a:t>
+              <a:t>20/6/19</a:t>
             </a:fld>
             <a:endParaRPr lang="es-ES"/>
           </a:p>
@@ -11488,7 +11504,7 @@
           <a:p>
             <a:fld id="{FBF76040-BE8F-6D48-9C04-285ED6B08B7E}" type="datetime1">
               <a:rPr lang="es-AR" smtClean="0"/>
-              <a:t>15/5/2019</a:t>
+              <a:t>20/6/19</a:t>
             </a:fld>
             <a:endParaRPr lang="es-ES"/>
           </a:p>
@@ -11703,7 +11719,7 @@
           <a:p>
             <a:fld id="{631FFB15-6494-ED4F-B989-C73B6FF6A883}" type="datetime1">
               <a:rPr lang="es-AR" smtClean="0"/>
-              <a:t>15/5/2019</a:t>
+              <a:t>20/6/19</a:t>
             </a:fld>
             <a:endParaRPr lang="es-ES"/>
           </a:p>
@@ -11898,7 +11914,7 @@
           <a:p>
             <a:fld id="{B0D1999D-6487-D642-9FEF-D7133FAE223D}" type="datetime1">
               <a:rPr lang="es-AR" smtClean="0"/>
-              <a:t>15/5/2019</a:t>
+              <a:t>20/6/19</a:t>
             </a:fld>
             <a:endParaRPr lang="es-ES"/>
           </a:p>
@@ -12072,7 +12088,7 @@
           <a:p>
             <a:fld id="{1ED52D60-B478-E04E-9E13-9DFABB61AA87}" type="datetime1">
               <a:rPr lang="es-AR" smtClean="0"/>
-              <a:t>15/5/2019</a:t>
+              <a:t>20/6/19</a:t>
             </a:fld>
             <a:endParaRPr lang="es-ES"/>
           </a:p>
@@ -12426,7 +12442,7 @@
           <a:p>
             <a:fld id="{737D9576-0215-9F4D-91E7-5635C8F00B02}" type="datetime1">
               <a:rPr lang="es-AR" smtClean="0"/>
-              <a:t>15/5/2019</a:t>
+              <a:t>20/6/19</a:t>
             </a:fld>
             <a:endParaRPr lang="es-ES"/>
           </a:p>
@@ -12773,7 +12789,7 @@
           <a:p>
             <a:fld id="{1BF12B2A-7BBD-144C-9B39-8C0976B4ECBA}" type="datetime1">
               <a:rPr lang="es-AR" smtClean="0"/>
-              <a:t>15/5/2019</a:t>
+              <a:t>20/6/19</a:t>
             </a:fld>
             <a:endParaRPr lang="es-AR"/>
           </a:p>
@@ -17080,7 +17096,7 @@
           <a:p>
             <a:fld id="{A574BCE3-488B-8949-809C-508C9D0A442A}" type="datetime1">
               <a:rPr lang="es-AR" smtClean="0"/>
-              <a:t>15/5/2019</a:t>
+              <a:t>20/6/19</a:t>
             </a:fld>
             <a:endParaRPr lang="es-ES"/>
           </a:p>
@@ -17436,7 +17452,7 @@
           <a:p>
             <a:fld id="{81D78CCF-041B-7545-A85B-8FECF10DFC19}" type="datetime1">
               <a:rPr lang="es-AR" smtClean="0"/>
-              <a:t>15/5/2019</a:t>
+              <a:t>20/6/19</a:t>
             </a:fld>
             <a:endParaRPr lang="es-ES"/>
           </a:p>
@@ -17796,7 +17812,7 @@
           <a:p>
             <a:fld id="{491E35E0-23B2-504E-904A-450FDB3092AA}" type="datetime1">
               <a:rPr lang="es-AR" smtClean="0"/>
-              <a:t>15/5/2019</a:t>
+              <a:t>20/6/19</a:t>
             </a:fld>
             <a:endParaRPr lang="es-ES"/>
           </a:p>
@@ -18708,7 +18724,7 @@
           <a:p>
             <a:fld id="{94FE928C-F5F8-FF40-973B-F7BEA73165C1}" type="datetime1">
               <a:rPr lang="es-AR" smtClean="0"/>
-              <a:t>15/5/2019</a:t>
+              <a:t>20/6/19</a:t>
             </a:fld>
             <a:endParaRPr lang="es-ES"/>
           </a:p>
@@ -19070,7 +19086,7 @@
           <a:p>
             <a:fld id="{C9EDBE1F-758E-0845-8418-43CD698E191C}" type="datetime1">
               <a:rPr lang="es-AR" smtClean="0"/>
-              <a:t>15/5/2019</a:t>
+              <a:t>20/6/19</a:t>
             </a:fld>
             <a:endParaRPr lang="es-ES"/>
           </a:p>
@@ -19683,7 +19699,7 @@
           <a:p>
             <a:fld id="{C261A69A-9DD1-C040-A5B2-371B0D335991}" type="datetime1">
               <a:rPr lang="es-AR" smtClean="0"/>
-              <a:t>15/5/2019</a:t>
+              <a:t>20/6/19</a:t>
             </a:fld>
             <a:endParaRPr lang="es-ES"/>
           </a:p>
@@ -20048,7 +20064,7 @@
           <a:p>
             <a:fld id="{9622DE54-0077-4748-A7B4-1C77D7826A20}" type="datetime1">
               <a:rPr lang="es-AR" smtClean="0"/>
-              <a:t>15/5/2019</a:t>
+              <a:t>20/6/19</a:t>
             </a:fld>
             <a:endParaRPr lang="es-ES"/>
           </a:p>
@@ -20934,7 +20950,7 @@
           <a:p>
             <a:fld id="{B1B118C3-1BCC-1846-AA92-8BF481FA2B18}" type="datetime1">
               <a:rPr lang="es-AR" smtClean="0"/>
-              <a:t>15/5/2019</a:t>
+              <a:t>20/6/19</a:t>
             </a:fld>
             <a:endParaRPr lang="es-ES"/>
           </a:p>
@@ -21285,7 +21301,7 @@
           <a:p>
             <a:fld id="{E04D589D-C881-F048-BC85-6746B71CB251}" type="datetime1">
               <a:rPr lang="es-AR" smtClean="0"/>
-              <a:t>15/5/2019</a:t>
+              <a:t>20/6/19</a:t>
             </a:fld>
             <a:endParaRPr lang="es-ES"/>
           </a:p>
@@ -24594,7 +24610,7 @@
           <a:p>
             <a:fld id="{BD54667F-D996-1240-A435-A67628C1ED60}" type="datetime1">
               <a:rPr lang="es-AR" smtClean="0"/>
-              <a:t>15/5/2019</a:t>
+              <a:t>20/6/19</a:t>
             </a:fld>
             <a:endParaRPr lang="es-ES"/>
           </a:p>
@@ -27205,7 +27221,7 @@
           <a:p>
             <a:fld id="{EB7486CE-3996-0F4A-99FF-63CDAF73E2AD}" type="datetime1">
               <a:rPr lang="es-AR" smtClean="0"/>
-              <a:t>15/5/2019</a:t>
+              <a:t>20/6/19</a:t>
             </a:fld>
             <a:endParaRPr lang="es-AR"/>
           </a:p>
@@ -27335,7 +27351,7 @@
           <a:p>
             <a:fld id="{6AB53766-BD27-F147-926A-CBE1CBCED353}" type="datetime1">
               <a:rPr lang="es-AR" smtClean="0"/>
-              <a:t>15/5/2019</a:t>
+              <a:t>20/6/19</a:t>
             </a:fld>
             <a:endParaRPr lang="es-ES"/>
           </a:p>
@@ -27743,7 +27759,7 @@
           <a:p>
             <a:fld id="{BDF02696-1F89-A145-9DF7-FA804814F905}" type="datetime1">
               <a:rPr lang="es-AR" smtClean="0"/>
-              <a:t>15/5/2019</a:t>
+              <a:t>20/6/19</a:t>
             </a:fld>
             <a:endParaRPr lang="es-ES"/>
           </a:p>
@@ -27973,7 +27989,7 @@
           <a:p>
             <a:fld id="{043F1C56-61A2-1B42-AD35-B5C7B3FB7AD4}" type="datetime1">
               <a:rPr lang="es-AR" smtClean="0"/>
-              <a:t>15/5/2019</a:t>
+              <a:t>20/6/19</a:t>
             </a:fld>
             <a:endParaRPr lang="es-ES"/>
           </a:p>
@@ -28144,7 +28160,7 @@
           <a:p>
             <a:fld id="{A5641B83-F1AD-864E-9439-D63FF0548DD8}" type="datetime1">
               <a:rPr lang="es-AR" smtClean="0"/>
-              <a:t>15/5/2019</a:t>
+              <a:t>20/6/19</a:t>
             </a:fld>
             <a:endParaRPr lang="es-ES"/>
           </a:p>
@@ -28283,7 +28299,7 @@
           <a:p>
             <a:fld id="{9087D9E1-F70B-134D-916E-62FB71437C2D}" type="datetime1">
               <a:rPr lang="es-AR" smtClean="0"/>
-              <a:t>15/5/2019</a:t>
+              <a:t>20/6/19</a:t>
             </a:fld>
             <a:endParaRPr lang="es-ES"/>
           </a:p>
@@ -28449,7 +28465,7 @@
           <a:p>
             <a:fld id="{2D5695C4-98F0-2241-93F3-FA3285BD00F0}" type="datetime1">
               <a:rPr lang="es-AR" smtClean="0"/>
-              <a:t>15/5/2019</a:t>
+              <a:t>20/6/19</a:t>
             </a:fld>
             <a:endParaRPr lang="es-ES"/>
           </a:p>
@@ -28682,7 +28698,7 @@
           <a:p>
             <a:fld id="{CFA081B4-A4F0-7641-AC3F-6872D83B27BA}" type="datetime1">
               <a:rPr lang="es-AR" smtClean="0"/>
-              <a:t>15/5/2019</a:t>
+              <a:t>20/6/19</a:t>
             </a:fld>
             <a:endParaRPr lang="es-ES"/>
           </a:p>
@@ -28994,7 +29010,7 @@
           <a:p>
             <a:fld id="{9FD48E59-D1EB-6F4B-8088-50DF3DFB1F23}" type="datetime1">
               <a:rPr lang="es-AR" smtClean="0"/>
-              <a:t>15/5/2019</a:t>
+              <a:t>20/6/19</a:t>
             </a:fld>
             <a:endParaRPr lang="es-ES"/>
           </a:p>
@@ -29171,7 +29187,7 @@
           <a:p>
             <a:fld id="{B28DBD8D-5EB3-E841-8EDB-BDF94BF4F328}" type="datetime1">
               <a:rPr lang="es-AR" smtClean="0"/>
-              <a:t>15/5/2019</a:t>
+              <a:t>20/6/19</a:t>
             </a:fld>
             <a:endParaRPr lang="es-ES"/>
           </a:p>
@@ -33287,7 +33303,7 @@
           <a:p>
             <a:fld id="{0B8ACE05-28B2-9541-850A-B168C4BA1887}" type="datetime1">
               <a:rPr lang="es-AR" smtClean="0"/>
-              <a:t>15/5/2019</a:t>
+              <a:t>20/6/19</a:t>
             </a:fld>
             <a:endParaRPr lang="es-ES"/>
           </a:p>
@@ -33511,7 +33527,7 @@
           <a:p>
             <a:fld id="{EB7486CE-3996-0F4A-99FF-63CDAF73E2AD}" type="datetime1">
               <a:rPr lang="es-AR" smtClean="0"/>
-              <a:t>15/5/2019</a:t>
+              <a:t>20/6/19</a:t>
             </a:fld>
             <a:endParaRPr lang="es-AR"/>
           </a:p>
@@ -33730,7 +33746,7 @@
           <a:p>
             <a:fld id="{9C7B7AA1-8722-0A46-971C-2021D870BE0B}" type="datetime1">
               <a:rPr lang="es-AR" smtClean="0"/>
-              <a:t>15/5/2019</a:t>
+              <a:t>20/6/19</a:t>
             </a:fld>
             <a:endParaRPr lang="es-ES"/>
           </a:p>
@@ -33940,7 +33956,7 @@
           <a:p>
             <a:fld id="{D1DD9AE5-38F3-9747-AA34-A99CC7A1ECB4}" type="datetime1">
               <a:rPr lang="es-AR" smtClean="0"/>
-              <a:t>15/5/2019</a:t>
+              <a:t>20/6/19</a:t>
             </a:fld>
             <a:endParaRPr lang="es-ES"/>
           </a:p>
@@ -34191,7 +34207,7 @@
           <a:p>
             <a:fld id="{FBC82690-2614-3745-AAF0-DDD861D36445}" type="datetime1">
               <a:rPr lang="es-AR" smtClean="0"/>
-              <a:t>15/5/2019</a:t>
+              <a:t>20/6/19</a:t>
             </a:fld>
             <a:endParaRPr lang="es-ES"/>
           </a:p>
@@ -34330,7 +34346,7 @@
           <a:p>
             <a:fld id="{2932991C-DB4A-B240-B599-3375A87D1965}" type="datetime1">
               <a:rPr lang="es-AR" smtClean="0"/>
-              <a:t>15/5/2019</a:t>
+              <a:t>20/6/19</a:t>
             </a:fld>
             <a:endParaRPr lang="es-ES"/>
           </a:p>
@@ -34538,7 +34554,7 @@
           <a:p>
             <a:fld id="{1122DBD9-5B5F-D94C-B511-14CF0391505D}" type="datetime1">
               <a:rPr lang="es-AR" smtClean="0"/>
-              <a:t>15/5/2019</a:t>
+              <a:t>20/6/19</a:t>
             </a:fld>
             <a:endParaRPr lang="es-ES"/>
           </a:p>
@@ -34732,7 +34748,7 @@
           <a:p>
             <a:fld id="{F5215084-32C7-6647-8222-3499B0C82716}" type="datetime1">
               <a:rPr lang="es-AR" smtClean="0"/>
-              <a:t>15/5/2019</a:t>
+              <a:t>20/6/19</a:t>
             </a:fld>
             <a:endParaRPr lang="es-ES"/>
           </a:p>
@@ -35576,7 +35592,7 @@
           <a:p>
             <a:fld id="{40D283F9-E02A-9E4A-8002-63FC1F39BF34}" type="datetime1">
               <a:rPr lang="es-AR" smtClean="0"/>
-              <a:t>15/5/2019</a:t>
+              <a:t>20/6/19</a:t>
             </a:fld>
             <a:endParaRPr lang="es-ES"/>
           </a:p>
@@ -36013,7 +36029,7 @@
           <a:p>
             <a:fld id="{AEF79C14-932E-7343-B4F1-4F6EF890D177}" type="datetime1">
               <a:rPr lang="es-AR" smtClean="0"/>
-              <a:t>15/5/2019</a:t>
+              <a:t>20/6/19</a:t>
             </a:fld>
             <a:endParaRPr lang="es-ES"/>
           </a:p>
@@ -37314,7 +37330,7 @@
           <a:p>
             <a:fld id="{91D63055-C6D5-3441-9FEE-A3E4C114B711}" type="datetime1">
               <a:rPr lang="es-AR" smtClean="0"/>
-              <a:t>15/5/2019</a:t>
+              <a:t>20/6/19</a:t>
             </a:fld>
             <a:endParaRPr lang="es-ES"/>
           </a:p>
@@ -37397,7 +37413,7 @@
           <a:noFill/>
           <a:extLst>
             <a:ext uri="{909E8E84-426E-40dd-AFC4-6F175D3DCCD1}">
-              <a14:hiddenFill xmlns="" xmlns:a14="http://schemas.microsoft.com/office/drawing/2010/main">
+              <a14:hiddenFill xmlns:a14="http://schemas.microsoft.com/office/drawing/2010/main" xmlns="">
                 <a:solidFill>
                   <a:srgbClr val="FFFFFF"/>
                 </a:solidFill>
@@ -37438,7 +37454,7 @@
           <a:noFill/>
           <a:extLst>
             <a:ext uri="{909E8E84-426E-40dd-AFC4-6F175D3DCCD1}">
-              <a14:hiddenFill xmlns="" xmlns:a14="http://schemas.microsoft.com/office/drawing/2010/main">
+              <a14:hiddenFill xmlns:a14="http://schemas.microsoft.com/office/drawing/2010/main" xmlns="">
                 <a:solidFill>
                   <a:srgbClr val="FFFFFF"/>
                 </a:solidFill>
@@ -37479,7 +37495,7 @@
           <a:noFill/>
           <a:extLst>
             <a:ext uri="{909E8E84-426E-40dd-AFC4-6F175D3DCCD1}">
-              <a14:hiddenFill xmlns="" xmlns:a14="http://schemas.microsoft.com/office/drawing/2010/main">
+              <a14:hiddenFill xmlns:a14="http://schemas.microsoft.com/office/drawing/2010/main" xmlns="">
                 <a:solidFill>
                   <a:srgbClr val="FFFFFF"/>
                 </a:solidFill>
@@ -37520,7 +37536,7 @@
           <a:noFill/>
           <a:extLst>
             <a:ext uri="{909E8E84-426E-40dd-AFC4-6F175D3DCCD1}">
-              <a14:hiddenFill xmlns="" xmlns:a14="http://schemas.microsoft.com/office/drawing/2010/main">
+              <a14:hiddenFill xmlns:a14="http://schemas.microsoft.com/office/drawing/2010/main" xmlns="">
                 <a:solidFill>
                   <a:srgbClr val="FFFFFF"/>
                 </a:solidFill>
@@ -37561,7 +37577,7 @@
           <a:noFill/>
           <a:extLst>
             <a:ext uri="{909E8E84-426E-40dd-AFC4-6F175D3DCCD1}">
-              <a14:hiddenFill xmlns="" xmlns:a14="http://schemas.microsoft.com/office/drawing/2010/main">
+              <a14:hiddenFill xmlns:a14="http://schemas.microsoft.com/office/drawing/2010/main" xmlns="">
                 <a:solidFill>
                   <a:srgbClr val="FFFFFF"/>
                 </a:solidFill>
@@ -37602,7 +37618,7 @@
           <a:noFill/>
           <a:extLst>
             <a:ext uri="{909E8E84-426E-40dd-AFC4-6F175D3DCCD1}">
-              <a14:hiddenFill xmlns="" xmlns:a14="http://schemas.microsoft.com/office/drawing/2010/main">
+              <a14:hiddenFill xmlns:a14="http://schemas.microsoft.com/office/drawing/2010/main" xmlns="">
                 <a:solidFill>
                   <a:srgbClr val="FFFFFF"/>
                 </a:solidFill>
@@ -37894,7 +37910,7 @@
           <a:p>
             <a:fld id="{C398B379-B26A-974F-943A-13F646E68ACA}" type="datetime1">
               <a:rPr lang="es-AR" smtClean="0"/>
-              <a:t>15/5/2019</a:t>
+              <a:t>20/6/19</a:t>
             </a:fld>
             <a:endParaRPr lang="es-ES"/>
           </a:p>
@@ -38562,7 +38578,7 @@
           <a:p>
             <a:fld id="{EB7486CE-3996-0F4A-99FF-63CDAF73E2AD}" type="datetime1">
               <a:rPr lang="es-AR" smtClean="0"/>
-              <a:t>15/5/2019</a:t>
+              <a:t>20/6/19</a:t>
             </a:fld>
             <a:endParaRPr lang="es-AR"/>
           </a:p>
@@ -38932,7 +38948,7 @@
           <a:p>
             <a:fld id="{EB7486CE-3996-0F4A-99FF-63CDAF73E2AD}" type="datetime1">
               <a:rPr lang="es-AR" smtClean="0"/>
-              <a:t>15/5/2019</a:t>
+              <a:t>20/6/19</a:t>
             </a:fld>
             <a:endParaRPr lang="es-AR"/>
           </a:p>
@@ -39101,7 +39117,7 @@
           <a:noFill/>
           <a:extLst>
             <a:ext uri="{909E8E84-426E-40dd-AFC4-6F175D3DCCD1}">
-              <a14:hiddenFill xmlns="" xmlns:a14="http://schemas.microsoft.com/office/drawing/2010/main">
+              <a14:hiddenFill xmlns:a14="http://schemas.microsoft.com/office/drawing/2010/main" xmlns="">
                 <a:solidFill>
                   <a:srgbClr val="FFFFFF"/>
                 </a:solidFill>
@@ -39132,7 +39148,7 @@
           <a:p>
             <a:fld id="{EB7486CE-3996-0F4A-99FF-63CDAF73E2AD}" type="datetime1">
               <a:rPr lang="es-AR" smtClean="0"/>
-              <a:t>15/5/2019</a:t>
+              <a:t>20/6/19</a:t>
             </a:fld>
             <a:endParaRPr lang="es-AR"/>
           </a:p>
@@ -39233,7 +39249,12 @@
             <p:ph type="title"/>
           </p:nvPr>
         </p:nvSpPr>
-        <p:spPr/>
+        <p:spPr>
+          <a:xfrm>
+            <a:off x="252919" y="1123837"/>
+            <a:ext cx="3048546" cy="4601183"/>
+          </a:xfrm>
+        </p:spPr>
         <p:txBody>
           <a:bodyPr>
             <a:normAutofit/>
@@ -39241,7 +39262,7 @@
           <a:lstStyle/>
           <a:p>
             <a:r>
-              <a:rPr lang="es-AR" dirty="0"/>
+              <a:rPr lang="es-AR" sz="3200" dirty="0"/>
               <a:t>Principio de Responsabilidad Única</a:t>
             </a:r>
           </a:p>
@@ -39331,7 +39352,7 @@
           <a:p>
             <a:fld id="{EB7486CE-3996-0F4A-99FF-63CDAF73E2AD}" type="datetime1">
               <a:rPr lang="es-AR" smtClean="0"/>
-              <a:t>15/5/2019</a:t>
+              <a:t>20/6/19</a:t>
             </a:fld>
             <a:endParaRPr lang="es-AR"/>
           </a:p>
@@ -39443,8 +39464,12 @@
           <a:lstStyle/>
           <a:p>
             <a:r>
+              <a:rPr lang="es-ES" sz="3200" dirty="0"/>
+              <a:t>Responsabilidad</a:t>
+            </a:r>
+            <a:r>
               <a:rPr lang="es-ES" dirty="0"/>
-              <a:t>Responsabilidad </a:t>
+              <a:t> </a:t>
             </a:r>
           </a:p>
         </p:txBody>
@@ -39527,7 +39552,7 @@
           <a:p>
             <a:fld id="{EB7486CE-3996-0F4A-99FF-63CDAF73E2AD}" type="datetime1">
               <a:rPr lang="es-AR" smtClean="0"/>
-              <a:t>15/5/2019</a:t>
+              <a:t>20/6/19</a:t>
             </a:fld>
             <a:endParaRPr lang="es-AR"/>
           </a:p>
@@ -39635,7 +39660,7 @@
           <a:p>
             <a:fld id="{735E8BA8-852D-B442-ABF5-DE223C8712DA}" type="datetime1">
               <a:rPr lang="es-AR" smtClean="0"/>
-              <a:t>15/5/2019</a:t>
+              <a:t>20/6/19</a:t>
             </a:fld>
             <a:endParaRPr lang="es-AR"/>
           </a:p>
@@ -39803,7 +39828,7 @@
           <a:p>
             <a:fld id="{735E8BA8-852D-B442-ABF5-DE223C8712DA}" type="datetime1">
               <a:rPr lang="es-AR" smtClean="0"/>
-              <a:t>15/5/2019</a:t>
+              <a:t>20/6/19</a:t>
             </a:fld>
             <a:endParaRPr lang="es-AR"/>
           </a:p>
@@ -39978,7 +40003,7 @@
           <a:p>
             <a:fld id="{735E8BA8-852D-B442-ABF5-DE223C8712DA}" type="datetime1">
               <a:rPr lang="es-AR" smtClean="0"/>
-              <a:t>15/5/2019</a:t>
+              <a:t>20/6/19</a:t>
             </a:fld>
             <a:endParaRPr lang="es-AR"/>
           </a:p>
@@ -40105,7 +40130,7 @@
           <a:p>
             <a:fld id="{735E8BA8-852D-B442-ABF5-DE223C8712DA}" type="datetime1">
               <a:rPr lang="es-AR" smtClean="0"/>
-              <a:t>15/5/2019</a:t>
+              <a:t>20/6/19</a:t>
             </a:fld>
             <a:endParaRPr lang="es-AR"/>
           </a:p>
@@ -40583,7 +40608,7 @@
           <a:p>
             <a:fld id="{EB7486CE-3996-0F4A-99FF-63CDAF73E2AD}" type="datetime1">
               <a:rPr lang="es-AR" smtClean="0"/>
-              <a:t>15/5/2019</a:t>
+              <a:t>20/6/19</a:t>
             </a:fld>
             <a:endParaRPr lang="es-AR"/>
           </a:p>
@@ -40748,7 +40773,7 @@
           <a:p>
             <a:fld id="{EB7486CE-3996-0F4A-99FF-63CDAF73E2AD}" type="datetime1">
               <a:rPr lang="es-AR" smtClean="0"/>
-              <a:t>15/5/2019</a:t>
+              <a:t>20/6/19</a:t>
             </a:fld>
             <a:endParaRPr lang="es-AR"/>
           </a:p>
@@ -40975,7 +41000,7 @@
           <a:p>
             <a:fld id="{EB7486CE-3996-0F4A-99FF-63CDAF73E2AD}" type="datetime1">
               <a:rPr lang="es-AR" smtClean="0"/>
-              <a:t>15/5/2019</a:t>
+              <a:t>20/6/19</a:t>
             </a:fld>
             <a:endParaRPr lang="es-AR"/>
           </a:p>
@@ -41137,7 +41162,7 @@
           <a:noFill/>
           <a:extLst>
             <a:ext uri="{909E8E84-426E-40dd-AFC4-6F175D3DCCD1}">
-              <a14:hiddenFill xmlns="" xmlns:a14="http://schemas.microsoft.com/office/drawing/2010/main">
+              <a14:hiddenFill xmlns:a14="http://schemas.microsoft.com/office/drawing/2010/main" xmlns="">
                 <a:solidFill>
                   <a:srgbClr val="FFFFFF"/>
                 </a:solidFill>
@@ -41168,7 +41193,7 @@
           <a:p>
             <a:fld id="{EB7486CE-3996-0F4A-99FF-63CDAF73E2AD}" type="datetime1">
               <a:rPr lang="es-AR" smtClean="0"/>
-              <a:t>15/5/2019</a:t>
+              <a:t>20/6/19</a:t>
             </a:fld>
             <a:endParaRPr lang="es-AR"/>
           </a:p>
@@ -41414,7 +41439,7 @@
           <a:noFill/>
           <a:extLst>
             <a:ext uri="{909E8E84-426E-40dd-AFC4-6F175D3DCCD1}">
-              <a14:hiddenFill xmlns="" xmlns:a14="http://schemas.microsoft.com/office/drawing/2010/main">
+              <a14:hiddenFill xmlns:a14="http://schemas.microsoft.com/office/drawing/2010/main" xmlns="">
                 <a:solidFill>
                   <a:srgbClr val="FFFFFF"/>
                 </a:solidFill>
@@ -41445,7 +41470,7 @@
           <a:p>
             <a:fld id="{EB7486CE-3996-0F4A-99FF-63CDAF73E2AD}" type="datetime1">
               <a:rPr lang="es-AR" smtClean="0"/>
-              <a:t>15/5/2019</a:t>
+              <a:t>20/6/19</a:t>
             </a:fld>
             <a:endParaRPr lang="es-AR"/>
           </a:p>
@@ -41666,14 +41691,14 @@
           <a:effectLst/>
           <a:extLst>
             <a:ext uri="{909E8E84-426E-40dd-AFC4-6F175D3DCCD1}">
-              <a14:hiddenFill xmlns="" xmlns:a14="http://schemas.microsoft.com/office/drawing/2010/main">
+              <a14:hiddenFill xmlns:a14="http://schemas.microsoft.com/office/drawing/2010/main" xmlns="">
                 <a:solidFill>
                   <a:schemeClr val="accent1"/>
                 </a:solidFill>
               </a14:hiddenFill>
             </a:ext>
             <a:ext uri="{91240B29-F687-4f45-9708-019B960494DF}">
-              <a14:hiddenLine xmlns="" xmlns:a14="http://schemas.microsoft.com/office/drawing/2010/main" w="9525">
+              <a14:hiddenLine xmlns:a14="http://schemas.microsoft.com/office/drawing/2010/main" xmlns="" w="9525">
                 <a:solidFill>
                   <a:schemeClr val="tx1"/>
                 </a:solidFill>
@@ -41683,7 +41708,7 @@
               </a14:hiddenLine>
             </a:ext>
             <a:ext uri="{AF507438-7753-43e0-B8FC-AC1667EBCBE1}">
-              <a14:hiddenEffects xmlns="" xmlns:a14="http://schemas.microsoft.com/office/drawing/2010/main">
+              <a14:hiddenEffects xmlns:a14="http://schemas.microsoft.com/office/drawing/2010/main" xmlns="">
                 <a:effectLst>
                   <a:outerShdw dist="35921" dir="2700000" algn="ctr" rotWithShape="0">
                     <a:schemeClr val="bg2"/>
@@ -41726,7 +41751,7 @@
           <a:noFill/>
           <a:extLst>
             <a:ext uri="{909E8E84-426E-40dd-AFC4-6F175D3DCCD1}">
-              <a14:hiddenFill xmlns="" xmlns:a14="http://schemas.microsoft.com/office/drawing/2010/main">
+              <a14:hiddenFill xmlns:a14="http://schemas.microsoft.com/office/drawing/2010/main" xmlns="">
                 <a:solidFill>
                   <a:srgbClr val="FFFFFF"/>
                 </a:solidFill>
@@ -41757,7 +41782,7 @@
           <a:p>
             <a:fld id="{EB7486CE-3996-0F4A-99FF-63CDAF73E2AD}" type="datetime1">
               <a:rPr lang="es-AR" smtClean="0"/>
-              <a:t>15/5/2019</a:t>
+              <a:t>20/6/19</a:t>
             </a:fld>
             <a:endParaRPr lang="es-AR"/>
           </a:p>
@@ -41865,7 +41890,7 @@
           <a:p>
             <a:fld id="{735E8BA8-852D-B442-ABF5-DE223C8712DA}" type="datetime1">
               <a:rPr lang="es-AR" smtClean="0"/>
-              <a:t>15/5/2019</a:t>
+              <a:t>20/6/19</a:t>
             </a:fld>
             <a:endParaRPr lang="es-AR"/>
           </a:p>
@@ -42010,7 +42035,7 @@
           <a:p>
             <a:fld id="{735E8BA8-852D-B442-ABF5-DE223C8712DA}" type="datetime1">
               <a:rPr lang="es-AR" smtClean="0"/>
-              <a:t>15/5/2019</a:t>
+              <a:t>20/6/19</a:t>
             </a:fld>
             <a:endParaRPr lang="es-AR"/>
           </a:p>
@@ -42165,7 +42190,7 @@
           <a:p>
             <a:fld id="{735E8BA8-852D-B442-ABF5-DE223C8712DA}" type="datetime1">
               <a:rPr lang="es-AR" smtClean="0"/>
-              <a:t>15/5/2019</a:t>
+              <a:t>20/6/19</a:t>
             </a:fld>
             <a:endParaRPr lang="es-AR"/>
           </a:p>
@@ -42287,7 +42312,7 @@
           <a:p>
             <a:fld id="{735E8BA8-852D-B442-ABF5-DE223C8712DA}" type="datetime1">
               <a:rPr lang="es-AR" smtClean="0"/>
-              <a:t>15/5/2019</a:t>
+              <a:t>20/6/19</a:t>
             </a:fld>
             <a:endParaRPr lang="es-AR"/>
           </a:p>
@@ -42516,7 +42541,7 @@
           <a:p>
             <a:fld id="{EB7486CE-3996-0F4A-99FF-63CDAF73E2AD}" type="datetime1">
               <a:rPr lang="es-AR" smtClean="0"/>
-              <a:t>15/5/2019</a:t>
+              <a:t>20/6/19</a:t>
             </a:fld>
             <a:endParaRPr lang="es-AR"/>
           </a:p>
@@ -42666,14 +42691,14 @@
           <a:effectLst/>
           <a:extLst>
             <a:ext uri="{909E8E84-426E-40dd-AFC4-6F175D3DCCD1}">
-              <a14:hiddenFill xmlns="" xmlns:a14="http://schemas.microsoft.com/office/drawing/2010/main">
+              <a14:hiddenFill xmlns:a14="http://schemas.microsoft.com/office/drawing/2010/main" xmlns="">
                 <a:solidFill>
                   <a:schemeClr val="accent1"/>
                 </a:solidFill>
               </a14:hiddenFill>
             </a:ext>
             <a:ext uri="{91240B29-F687-4f45-9708-019B960494DF}">
-              <a14:hiddenLine xmlns="" xmlns:a14="http://schemas.microsoft.com/office/drawing/2010/main" w="9525">
+              <a14:hiddenLine xmlns:a14="http://schemas.microsoft.com/office/drawing/2010/main" xmlns="" w="9525">
                 <a:solidFill>
                   <a:schemeClr val="tx1"/>
                 </a:solidFill>
@@ -42683,7 +42708,7 @@
               </a14:hiddenLine>
             </a:ext>
             <a:ext uri="{AF507438-7753-43e0-B8FC-AC1667EBCBE1}">
-              <a14:hiddenEffects xmlns="" xmlns:a14="http://schemas.microsoft.com/office/drawing/2010/main">
+              <a14:hiddenEffects xmlns:a14="http://schemas.microsoft.com/office/drawing/2010/main" xmlns="">
                 <a:effectLst>
                   <a:outerShdw dist="35921" dir="2700000" algn="ctr" rotWithShape="0">
                     <a:schemeClr val="bg2"/>
@@ -42730,14 +42755,14 @@
           <a:effectLst/>
           <a:extLst>
             <a:ext uri="{909E8E84-426E-40dd-AFC4-6F175D3DCCD1}">
-              <a14:hiddenFill xmlns="" xmlns:a14="http://schemas.microsoft.com/office/drawing/2010/main">
+              <a14:hiddenFill xmlns:a14="http://schemas.microsoft.com/office/drawing/2010/main" xmlns="">
                 <a:solidFill>
                   <a:schemeClr val="accent1"/>
                 </a:solidFill>
               </a14:hiddenFill>
             </a:ext>
             <a:ext uri="{91240B29-F687-4f45-9708-019B960494DF}">
-              <a14:hiddenLine xmlns="" xmlns:a14="http://schemas.microsoft.com/office/drawing/2010/main" w="9525">
+              <a14:hiddenLine xmlns:a14="http://schemas.microsoft.com/office/drawing/2010/main" xmlns="" w="9525">
                 <a:solidFill>
                   <a:schemeClr val="tx1"/>
                 </a:solidFill>
@@ -42747,7 +42772,7 @@
               </a14:hiddenLine>
             </a:ext>
             <a:ext uri="{AF507438-7753-43e0-B8FC-AC1667EBCBE1}">
-              <a14:hiddenEffects xmlns="" xmlns:a14="http://schemas.microsoft.com/office/drawing/2010/main">
+              <a14:hiddenEffects xmlns:a14="http://schemas.microsoft.com/office/drawing/2010/main" xmlns="">
                 <a:effectLst>
                   <a:outerShdw dist="35921" dir="2700000" algn="ctr" rotWithShape="0">
                     <a:schemeClr val="bg2"/>
@@ -42780,7 +42805,7 @@
           <a:p>
             <a:fld id="{EB7486CE-3996-0F4A-99FF-63CDAF73E2AD}" type="datetime1">
               <a:rPr lang="es-AR" smtClean="0"/>
-              <a:t>15/5/2019</a:t>
+              <a:t>20/6/19</a:t>
             </a:fld>
             <a:endParaRPr lang="es-AR"/>
           </a:p>
@@ -43083,7 +43108,7 @@
           <a:p>
             <a:fld id="{EB7486CE-3996-0F4A-99FF-63CDAF73E2AD}" type="datetime1">
               <a:rPr lang="es-AR" smtClean="0"/>
-              <a:t>15/5/2019</a:t>
+              <a:t>20/6/19</a:t>
             </a:fld>
             <a:endParaRPr lang="es-AR"/>
           </a:p>
@@ -43239,14 +43264,14 @@
           </a:ln>
           <a:extLst>
             <a:ext uri="{909E8E84-426E-40dd-AFC4-6F175D3DCCD1}">
-              <a14:hiddenFill xmlns="" xmlns:a14="http://schemas.microsoft.com/office/drawing/2010/main">
+              <a14:hiddenFill xmlns:a14="http://schemas.microsoft.com/office/drawing/2010/main" xmlns="">
                 <a:solidFill>
                   <a:schemeClr val="accent1"/>
                 </a:solidFill>
               </a14:hiddenFill>
             </a:ext>
             <a:ext uri="{91240B29-F687-4f45-9708-019B960494DF}">
-              <a14:hiddenLine xmlns="" xmlns:a14="http://schemas.microsoft.com/office/drawing/2010/main" w="9525">
+              <a14:hiddenLine xmlns:a14="http://schemas.microsoft.com/office/drawing/2010/main" xmlns="" w="9525">
                 <a:solidFill>
                   <a:schemeClr val="tx1"/>
                 </a:solidFill>
@@ -43293,14 +43318,14 @@
           </a:ln>
           <a:extLst>
             <a:ext uri="{909E8E84-426E-40dd-AFC4-6F175D3DCCD1}">
-              <a14:hiddenFill xmlns="" xmlns:a14="http://schemas.microsoft.com/office/drawing/2010/main">
+              <a14:hiddenFill xmlns:a14="http://schemas.microsoft.com/office/drawing/2010/main" xmlns="">
                 <a:solidFill>
                   <a:schemeClr val="accent1"/>
                 </a:solidFill>
               </a14:hiddenFill>
             </a:ext>
             <a:ext uri="{91240B29-F687-4f45-9708-019B960494DF}">
-              <a14:hiddenLine xmlns="" xmlns:a14="http://schemas.microsoft.com/office/drawing/2010/main" w="9525">
+              <a14:hiddenLine xmlns:a14="http://schemas.microsoft.com/office/drawing/2010/main" xmlns="" w="9525">
                 <a:solidFill>
                   <a:schemeClr val="tx1"/>
                 </a:solidFill>
@@ -43344,7 +43369,7 @@
           <a:noFill/>
           <a:extLst>
             <a:ext uri="{909E8E84-426E-40dd-AFC4-6F175D3DCCD1}">
-              <a14:hiddenFill xmlns="" xmlns:a14="http://schemas.microsoft.com/office/drawing/2010/main">
+              <a14:hiddenFill xmlns:a14="http://schemas.microsoft.com/office/drawing/2010/main" xmlns="">
                 <a:solidFill>
                   <a:srgbClr val="FFFFFF"/>
                 </a:solidFill>
@@ -43375,7 +43400,7 @@
           <a:p>
             <a:fld id="{EB7486CE-3996-0F4A-99FF-63CDAF73E2AD}" type="datetime1">
               <a:rPr lang="es-AR" smtClean="0"/>
-              <a:t>15/5/2019</a:t>
+              <a:t>20/6/19</a:t>
             </a:fld>
             <a:endParaRPr lang="es-AR"/>
           </a:p>
@@ -43850,7 +43875,7 @@
           <a:p>
             <a:fld id="{EB7486CE-3996-0F4A-99FF-63CDAF73E2AD}" type="datetime1">
               <a:rPr lang="es-AR" smtClean="0"/>
-              <a:t>15/5/2019</a:t>
+              <a:t>20/6/19</a:t>
             </a:fld>
             <a:endParaRPr lang="es-AR"/>
           </a:p>
@@ -44017,7 +44042,7 @@
           <a:noFill/>
           <a:extLst>
             <a:ext uri="{909E8E84-426E-40dd-AFC4-6F175D3DCCD1}">
-              <a14:hiddenFill xmlns="" xmlns:a14="http://schemas.microsoft.com/office/drawing/2010/main">
+              <a14:hiddenFill xmlns:a14="http://schemas.microsoft.com/office/drawing/2010/main" xmlns="">
                 <a:solidFill>
                   <a:srgbClr val="FFFFFF"/>
                 </a:solidFill>
@@ -44048,7 +44073,7 @@
           <a:p>
             <a:fld id="{EB7486CE-3996-0F4A-99FF-63CDAF73E2AD}" type="datetime1">
               <a:rPr lang="es-AR" smtClean="0"/>
-              <a:t>15/5/2019</a:t>
+              <a:t>20/6/19</a:t>
             </a:fld>
             <a:endParaRPr lang="es-AR"/>
           </a:p>
@@ -44246,7 +44271,7 @@
           <a:noFill/>
           <a:extLst>
             <a:ext uri="{909E8E84-426E-40dd-AFC4-6F175D3DCCD1}">
-              <a14:hiddenFill xmlns="" xmlns:a14="http://schemas.microsoft.com/office/drawing/2010/main">
+              <a14:hiddenFill xmlns:a14="http://schemas.microsoft.com/office/drawing/2010/main" xmlns="">
                 <a:solidFill>
                   <a:srgbClr val="FFFFFF"/>
                 </a:solidFill>
@@ -44277,7 +44302,7 @@
           <a:p>
             <a:fld id="{EB7486CE-3996-0F4A-99FF-63CDAF73E2AD}" type="datetime1">
               <a:rPr lang="es-AR" smtClean="0"/>
-              <a:t>15/5/2019</a:t>
+              <a:t>20/6/19</a:t>
             </a:fld>
             <a:endParaRPr lang="es-AR"/>
           </a:p>
@@ -44467,7 +44492,7 @@
           <a:p>
             <a:fld id="{EB7486CE-3996-0F4A-99FF-63CDAF73E2AD}" type="datetime1">
               <a:rPr lang="es-AR" smtClean="0"/>
-              <a:t>15/5/2019</a:t>
+              <a:t>20/6/19</a:t>
             </a:fld>
             <a:endParaRPr lang="es-AR"/>
           </a:p>
@@ -44659,7 +44684,7 @@
         </p:nvSpPr>
         <p:spPr>
           <a:xfrm>
-            <a:off x="4367342" y="1753744"/>
+            <a:off x="4367342" y="1384899"/>
             <a:ext cx="6480720" cy="646331"/>
           </a:xfrm>
           <a:prstGeom prst="rect">
@@ -44715,7 +44740,7 @@
           <a:p>
             <a:fld id="{EB7486CE-3996-0F4A-99FF-63CDAF73E2AD}" type="datetime1">
               <a:rPr lang="es-AR" smtClean="0"/>
-              <a:t>15/5/2019</a:t>
+              <a:t>20/6/19</a:t>
             </a:fld>
             <a:endParaRPr lang="es-AR"/>
           </a:p>
@@ -44864,14 +44889,14 @@
           <a:effectLst/>
           <a:extLst>
             <a:ext uri="{909E8E84-426E-40dd-AFC4-6F175D3DCCD1}">
-              <a14:hiddenFill xmlns="" xmlns:a14="http://schemas.microsoft.com/office/drawing/2010/main">
+              <a14:hiddenFill xmlns:a14="http://schemas.microsoft.com/office/drawing/2010/main" xmlns="">
                 <a:solidFill>
                   <a:schemeClr val="accent1"/>
                 </a:solidFill>
               </a14:hiddenFill>
             </a:ext>
             <a:ext uri="{91240B29-F687-4f45-9708-019B960494DF}">
-              <a14:hiddenLine xmlns="" xmlns:a14="http://schemas.microsoft.com/office/drawing/2010/main" w="9525">
+              <a14:hiddenLine xmlns:a14="http://schemas.microsoft.com/office/drawing/2010/main" xmlns="" w="9525">
                 <a:solidFill>
                   <a:schemeClr val="tx1"/>
                 </a:solidFill>
@@ -44881,7 +44906,7 @@
               </a14:hiddenLine>
             </a:ext>
             <a:ext uri="{AF507438-7753-43e0-B8FC-AC1667EBCBE1}">
-              <a14:hiddenEffects xmlns="" xmlns:a14="http://schemas.microsoft.com/office/drawing/2010/main">
+              <a14:hiddenEffects xmlns:a14="http://schemas.microsoft.com/office/drawing/2010/main" xmlns="">
                 <a:effectLst>
                   <a:outerShdw dist="35921" dir="2700000" algn="ctr" rotWithShape="0">
                     <a:schemeClr val="bg2"/>
@@ -44914,7 +44939,7 @@
           <a:p>
             <a:fld id="{EB7486CE-3996-0F4A-99FF-63CDAF73E2AD}" type="datetime1">
               <a:rPr lang="es-AR" smtClean="0"/>
-              <a:t>15/5/2019</a:t>
+              <a:t>20/6/19</a:t>
             </a:fld>
             <a:endParaRPr lang="es-AR"/>
           </a:p>
@@ -45100,7 +45125,7 @@
           <a:p>
             <a:fld id="{EB7486CE-3996-0F4A-99FF-63CDAF73E2AD}" type="datetime1">
               <a:rPr lang="es-AR" smtClean="0"/>
-              <a:t>15/5/2019</a:t>
+              <a:t>20/6/19</a:t>
             </a:fld>
             <a:endParaRPr lang="es-AR"/>
           </a:p>
@@ -45295,7 +45320,7 @@
           <a:p>
             <a:fld id="{EB7486CE-3996-0F4A-99FF-63CDAF73E2AD}" type="datetime1">
               <a:rPr lang="es-AR" smtClean="0"/>
-              <a:t>15/5/2019</a:t>
+              <a:t>20/6/19</a:t>
             </a:fld>
             <a:endParaRPr lang="es-AR"/>
           </a:p>
@@ -45457,7 +45482,7 @@
           <a:noFill/>
           <a:extLst>
             <a:ext uri="{909E8E84-426E-40dd-AFC4-6F175D3DCCD1}">
-              <a14:hiddenFill xmlns="" xmlns:a14="http://schemas.microsoft.com/office/drawing/2010/main">
+              <a14:hiddenFill xmlns:a14="http://schemas.microsoft.com/office/drawing/2010/main" xmlns="">
                 <a:solidFill>
                   <a:srgbClr val="FFFFFF"/>
                 </a:solidFill>
@@ -45488,7 +45513,7 @@
           <a:p>
             <a:fld id="{EB7486CE-3996-0F4A-99FF-63CDAF73E2AD}" type="datetime1">
               <a:rPr lang="es-AR" smtClean="0"/>
-              <a:t>15/5/2019</a:t>
+              <a:t>20/6/19</a:t>
             </a:fld>
             <a:endParaRPr lang="es-AR"/>
           </a:p>
@@ -45684,7 +45709,7 @@
           <a:noFill/>
           <a:extLst>
             <a:ext uri="{909E8E84-426E-40dd-AFC4-6F175D3DCCD1}">
-              <a14:hiddenFill xmlns="" xmlns:a14="http://schemas.microsoft.com/office/drawing/2010/main">
+              <a14:hiddenFill xmlns:a14="http://schemas.microsoft.com/office/drawing/2010/main" xmlns="">
                 <a:solidFill>
                   <a:srgbClr val="FFFFFF"/>
                 </a:solidFill>
@@ -45715,7 +45740,7 @@
           <a:p>
             <a:fld id="{EB7486CE-3996-0F4A-99FF-63CDAF73E2AD}" type="datetime1">
               <a:rPr lang="es-AR" smtClean="0"/>
-              <a:t>15/5/2019</a:t>
+              <a:t>20/6/19</a:t>
             </a:fld>
             <a:endParaRPr lang="es-AR"/>
           </a:p>
@@ -45861,7 +45886,7 @@
           <a:noFill/>
           <a:extLst>
             <a:ext uri="{909E8E84-426E-40dd-AFC4-6F175D3DCCD1}">
-              <a14:hiddenFill xmlns="" xmlns:a14="http://schemas.microsoft.com/office/drawing/2010/main">
+              <a14:hiddenFill xmlns:a14="http://schemas.microsoft.com/office/drawing/2010/main" xmlns="">
                 <a:solidFill>
                   <a:srgbClr val="FFFFFF"/>
                 </a:solidFill>
@@ -45892,7 +45917,7 @@
           <a:p>
             <a:fld id="{EB7486CE-3996-0F4A-99FF-63CDAF73E2AD}" type="datetime1">
               <a:rPr lang="es-AR" smtClean="0"/>
-              <a:t>15/5/2019</a:t>
+              <a:t>20/6/19</a:t>
             </a:fld>
             <a:endParaRPr lang="es-AR"/>
           </a:p>
@@ -46078,7 +46103,7 @@
           <a:p>
             <a:fld id="{EB7486CE-3996-0F4A-99FF-63CDAF73E2AD}" type="datetime1">
               <a:rPr lang="es-AR" smtClean="0"/>
-              <a:t>15/5/2019</a:t>
+              <a:t>20/6/19</a:t>
             </a:fld>
             <a:endParaRPr lang="es-AR"/>
           </a:p>
@@ -46247,7 +46272,7 @@
           <a:p>
             <a:fld id="{EB7486CE-3996-0F4A-99FF-63CDAF73E2AD}" type="datetime1">
               <a:rPr lang="es-AR" smtClean="0"/>
-              <a:t>15/5/2019</a:t>
+              <a:t>20/6/19</a:t>
             </a:fld>
             <a:endParaRPr lang="es-AR"/>
           </a:p>
@@ -47058,7 +47083,7 @@
           <a:p>
             <a:fld id="{EB7486CE-3996-0F4A-99FF-63CDAF73E2AD}" type="datetime1">
               <a:rPr lang="es-AR" smtClean="0"/>
-              <a:t>15/5/2019</a:t>
+              <a:t>20/6/19</a:t>
             </a:fld>
             <a:endParaRPr lang="es-AR"/>
           </a:p>
@@ -50357,7 +50382,7 @@
           <a:p>
             <a:fld id="{EB7486CE-3996-0F4A-99FF-63CDAF73E2AD}" type="datetime1">
               <a:rPr lang="es-AR" smtClean="0"/>
-              <a:t>15/5/2019</a:t>
+              <a:t>20/6/19</a:t>
             </a:fld>
             <a:endParaRPr lang="es-AR"/>
           </a:p>
@@ -50677,7 +50702,7 @@
           <a:p>
             <a:fld id="{EB7486CE-3996-0F4A-99FF-63CDAF73E2AD}" type="datetime1">
               <a:rPr lang="es-AR" smtClean="0"/>
-              <a:t>15/5/2019</a:t>
+              <a:t>20/6/19</a:t>
             </a:fld>
             <a:endParaRPr lang="es-AR"/>
           </a:p>
@@ -50872,7 +50897,7 @@
           <a:p>
             <a:fld id="{EB7486CE-3996-0F4A-99FF-63CDAF73E2AD}" type="datetime1">
               <a:rPr lang="es-AR" smtClean="0"/>
-              <a:t>15/5/2019</a:t>
+              <a:t>20/6/19</a:t>
             </a:fld>
             <a:endParaRPr lang="es-AR"/>
           </a:p>
@@ -51034,7 +51059,7 @@
           <a:noFill/>
           <a:extLst>
             <a:ext uri="{909E8E84-426E-40dd-AFC4-6F175D3DCCD1}">
-              <a14:hiddenFill xmlns="" xmlns:a14="http://schemas.microsoft.com/office/drawing/2010/main">
+              <a14:hiddenFill xmlns:a14="http://schemas.microsoft.com/office/drawing/2010/main" xmlns="">
                 <a:solidFill>
                   <a:srgbClr val="FFFFFF"/>
                 </a:solidFill>
@@ -51065,7 +51090,7 @@
           <a:p>
             <a:fld id="{EB7486CE-3996-0F4A-99FF-63CDAF73E2AD}" type="datetime1">
               <a:rPr lang="es-AR" smtClean="0"/>
-              <a:t>15/5/2019</a:t>
+              <a:t>20/6/19</a:t>
             </a:fld>
             <a:endParaRPr lang="es-AR"/>
           </a:p>
@@ -51247,7 +51272,7 @@
           <a:p>
             <a:fld id="{EB7486CE-3996-0F4A-99FF-63CDAF73E2AD}" type="datetime1">
               <a:rPr lang="es-AR" smtClean="0"/>
-              <a:t>15/5/2019</a:t>
+              <a:t>20/6/19</a:t>
             </a:fld>
             <a:endParaRPr lang="es-AR"/>
           </a:p>
@@ -51450,7 +51475,7 @@
           <a:p>
             <a:fld id="{EB7486CE-3996-0F4A-99FF-63CDAF73E2AD}" type="datetime1">
               <a:rPr lang="es-AR" smtClean="0"/>
-              <a:t>15/5/2019</a:t>
+              <a:t>20/6/19</a:t>
             </a:fld>
             <a:endParaRPr lang="es-AR"/>
           </a:p>
@@ -51596,7 +51621,7 @@
           <a:noFill/>
           <a:extLst>
             <a:ext uri="{909E8E84-426E-40dd-AFC4-6F175D3DCCD1}">
-              <a14:hiddenFill xmlns="" xmlns:a14="http://schemas.microsoft.com/office/drawing/2010/main">
+              <a14:hiddenFill xmlns:a14="http://schemas.microsoft.com/office/drawing/2010/main" xmlns="">
                 <a:solidFill>
                   <a:srgbClr val="FFFFFF"/>
                 </a:solidFill>
@@ -51627,7 +51652,7 @@
           <a:p>
             <a:fld id="{EB7486CE-3996-0F4A-99FF-63CDAF73E2AD}" type="datetime1">
               <a:rPr lang="es-AR" smtClean="0"/>
-              <a:t>15/5/2019</a:t>
+              <a:t>20/6/19</a:t>
             </a:fld>
             <a:endParaRPr lang="es-AR"/>
           </a:p>
@@ -51836,7 +51861,7 @@
           <a:p>
             <a:fld id="{EB7486CE-3996-0F4A-99FF-63CDAF73E2AD}" type="datetime1">
               <a:rPr lang="es-AR" smtClean="0"/>
-              <a:t>15/5/2019</a:t>
+              <a:t>20/6/19</a:t>
             </a:fld>
             <a:endParaRPr lang="es-AR"/>
           </a:p>
@@ -52151,7 +52176,7 @@
           <a:p>
             <a:fld id="{EB7486CE-3996-0F4A-99FF-63CDAF73E2AD}" type="datetime1">
               <a:rPr lang="es-AR" smtClean="0"/>
-              <a:t>15/5/2019</a:t>
+              <a:t>20/6/19</a:t>
             </a:fld>
             <a:endParaRPr lang="es-AR"/>
           </a:p>
@@ -52342,7 +52367,7 @@
           <a:p>
             <a:fld id="{EB7486CE-3996-0F4A-99FF-63CDAF73E2AD}" type="datetime1">
               <a:rPr lang="es-AR" smtClean="0"/>
-              <a:t>15/5/2019</a:t>
+              <a:t>20/6/19</a:t>
             </a:fld>
             <a:endParaRPr lang="es-AR"/>
           </a:p>
@@ -52507,7 +52532,7 @@
           <a:p>
             <a:fld id="{EB7486CE-3996-0F4A-99FF-63CDAF73E2AD}" type="datetime1">
               <a:rPr lang="es-AR" smtClean="0"/>
-              <a:t>15/5/2019</a:t>
+              <a:t>20/6/19</a:t>
             </a:fld>
             <a:endParaRPr lang="es-AR"/>
           </a:p>
@@ -52637,7 +52662,7 @@
           <a:p>
             <a:fld id="{7C845BD5-6C3F-804C-848D-1D88D07FD25A}" type="datetime1">
               <a:rPr lang="es-AR" smtClean="0"/>
-              <a:t>15/5/2019</a:t>
+              <a:t>20/6/19</a:t>
             </a:fld>
             <a:endParaRPr lang="es-ES"/>
           </a:p>
@@ -53038,7 +53063,7 @@
           <a:p>
             <a:fld id="{5B6BEF2A-0556-2D43-8670-DC2E6F66AD53}" type="datetime1">
               <a:rPr lang="es-AR" smtClean="0"/>
-              <a:t>15/5/2019</a:t>
+              <a:t>20/6/19</a:t>
             </a:fld>
             <a:endParaRPr lang="es-ES"/>
           </a:p>
@@ -53482,6 +53507,140 @@
     <p:extLst>
       <p:ext uri="{BB962C8B-B14F-4D97-AF65-F5344CB8AC3E}">
         <p14:creationId xmlns:p14="http://schemas.microsoft.com/office/powerpoint/2010/main" val="3626626652"/>
+      </p:ext>
+    </p:extLst>
+  </p:cSld>
+  <p:clrMapOvr>
+    <a:masterClrMapping/>
+  </p:clrMapOvr>
+</p:sld>
+</file>
+
+<file path=ppt/slides/slide96.xml><?xml version="1.0" encoding="utf-8"?>
+<p:sld xmlns:a="http://schemas.openxmlformats.org/drawingml/2006/main" xmlns:r="http://schemas.openxmlformats.org/officeDocument/2006/relationships" xmlns:p="http://schemas.openxmlformats.org/presentationml/2006/main">
+  <p:cSld>
+    <p:spTree>
+      <p:nvGrpSpPr>
+        <p:cNvPr id="1" name=""/>
+        <p:cNvGrpSpPr/>
+        <p:nvPr/>
+      </p:nvGrpSpPr>
+      <p:grpSpPr>
+        <a:xfrm>
+          <a:off x="0" y="0"/>
+          <a:ext cx="0" cy="0"/>
+          <a:chOff x="0" y="0"/>
+          <a:chExt cx="0" cy="0"/>
+        </a:xfrm>
+      </p:grpSpPr>
+      <p:sp>
+        <p:nvSpPr>
+          <p:cNvPr id="2" name="Marcador de fecha 1"/>
+          <p:cNvSpPr>
+            <a:spLocks noGrp="1"/>
+          </p:cNvSpPr>
+          <p:nvPr>
+            <p:ph type="dt" sz="half" idx="10"/>
+          </p:nvPr>
+        </p:nvSpPr>
+        <p:spPr/>
+        <p:txBody>
+          <a:bodyPr/>
+          <a:lstStyle/>
+          <a:p>
+            <a:fld id="{73452E24-E0A0-5F46-B617-998431C034B4}" type="datetime1">
+              <a:rPr lang="es-AR" smtClean="0"/>
+              <a:t>20/6/19</a:t>
+            </a:fld>
+            <a:endParaRPr lang="es-AR"/>
+          </a:p>
+        </p:txBody>
+      </p:sp>
+      <p:sp>
+        <p:nvSpPr>
+          <p:cNvPr id="3" name="Marcador de pie de página 2"/>
+          <p:cNvSpPr>
+            <a:spLocks noGrp="1"/>
+          </p:cNvSpPr>
+          <p:nvPr>
+            <p:ph type="ftr" sz="quarter" idx="11"/>
+          </p:nvPr>
+        </p:nvSpPr>
+        <p:spPr/>
+        <p:txBody>
+          <a:bodyPr/>
+          <a:lstStyle/>
+          <a:p>
+            <a:r>
+              <a:rPr lang="es-AR"/>
+              <a:t>Introducción a la Ingeniería de Software en Productos Médicos</a:t>
+            </a:r>
+          </a:p>
+        </p:txBody>
+      </p:sp>
+      <p:sp>
+        <p:nvSpPr>
+          <p:cNvPr id="4" name="Marcador de número de diapositiva 3"/>
+          <p:cNvSpPr>
+            <a:spLocks noGrp="1"/>
+          </p:cNvSpPr>
+          <p:nvPr>
+            <p:ph type="sldNum" sz="quarter" idx="12"/>
+          </p:nvPr>
+        </p:nvSpPr>
+        <p:spPr/>
+        <p:txBody>
+          <a:bodyPr/>
+          <a:lstStyle/>
+          <a:p>
+            <a:fld id="{ADDD444B-9BA7-4839-9538-2E5C85273323}" type="slidenum">
+              <a:rPr lang="es-AR" smtClean="0"/>
+              <a:t>96</a:t>
+            </a:fld>
+            <a:endParaRPr lang="es-AR"/>
+          </a:p>
+        </p:txBody>
+      </p:sp>
+      <p:sp>
+        <p:nvSpPr>
+          <p:cNvPr id="5" name="CuadroTexto 4"/>
+          <p:cNvSpPr txBox="1"/>
+          <p:nvPr/>
+        </p:nvSpPr>
+        <p:spPr>
+          <a:xfrm>
+            <a:off x="3935760" y="2852936"/>
+            <a:ext cx="4406976" cy="923330"/>
+          </a:xfrm>
+          <a:prstGeom prst="rect">
+            <a:avLst/>
+          </a:prstGeom>
+          <a:noFill/>
+        </p:spPr>
+        <p:txBody>
+          <a:bodyPr wrap="none" rtlCol="0">
+            <a:spAutoFit/>
+          </a:bodyPr>
+          <a:lstStyle/>
+          <a:p>
+            <a:r>
+              <a:rPr lang="es-ES" sz="5400" dirty="0">
+                <a:solidFill>
+                  <a:schemeClr val="accent1">
+                    <a:lumMod val="60000"/>
+                    <a:lumOff val="40000"/>
+                  </a:schemeClr>
+                </a:solidFill>
+              </a:rPr>
+              <a:t>Fin del Módulo</a:t>
+            </a:r>
+          </a:p>
+        </p:txBody>
+      </p:sp>
+    </p:spTree>
+    <p:extLst>
+      <p:ext uri="{BB962C8B-B14F-4D97-AF65-F5344CB8AC3E}">
+        <p14:creationId xmlns:p14="http://schemas.microsoft.com/office/powerpoint/2010/main" val="917694736"/>
       </p:ext>
     </p:extLst>
   </p:cSld>

</xml_diff>